<commit_message>
figures formatted for Interface
</commit_message>
<xml_diff>
--- a/figures and table/Fig01/motorwoc_Fig01.pptx
+++ b/figures and table/Fig01/motorwoc_Fig01.pptx
@@ -7,6 +7,7 @@
   <p:sldIdLst>
     <p:sldId id="269" r:id="rId2"/>
     <p:sldId id="271" r:id="rId3"/>
+    <p:sldId id="272" r:id="rId4"/>
   </p:sldIdLst>
   <p:sldSz cx="12192000" cy="6858000"/>
   <p:notesSz cx="6858000" cy="9144000"/>
@@ -244,7 +245,7 @@
           <a:p>
             <a:fld id="{EBD465F7-E794-4602-B363-1981CA8F30E1}" type="datetimeFigureOut">
               <a:rPr lang="en-US" smtClean="0"/>
-              <a:t>5/11/2022</a:t>
+              <a:t>6/14/2022</a:t>
             </a:fld>
             <a:endParaRPr lang="en-US"/>
           </a:p>
@@ -414,7 +415,7 @@
           <a:p>
             <a:fld id="{EBD465F7-E794-4602-B363-1981CA8F30E1}" type="datetimeFigureOut">
               <a:rPr lang="en-US" smtClean="0"/>
-              <a:t>5/11/2022</a:t>
+              <a:t>6/14/2022</a:t>
             </a:fld>
             <a:endParaRPr lang="en-US"/>
           </a:p>
@@ -594,7 +595,7 @@
           <a:p>
             <a:fld id="{EBD465F7-E794-4602-B363-1981CA8F30E1}" type="datetimeFigureOut">
               <a:rPr lang="en-US" smtClean="0"/>
-              <a:t>5/11/2022</a:t>
+              <a:t>6/14/2022</a:t>
             </a:fld>
             <a:endParaRPr lang="en-US"/>
           </a:p>
@@ -764,7 +765,7 @@
           <a:p>
             <a:fld id="{EBD465F7-E794-4602-B363-1981CA8F30E1}" type="datetimeFigureOut">
               <a:rPr lang="en-US" smtClean="0"/>
-              <a:t>5/11/2022</a:t>
+              <a:t>6/14/2022</a:t>
             </a:fld>
             <a:endParaRPr lang="en-US"/>
           </a:p>
@@ -1010,7 +1011,7 @@
           <a:p>
             <a:fld id="{EBD465F7-E794-4602-B363-1981CA8F30E1}" type="datetimeFigureOut">
               <a:rPr lang="en-US" smtClean="0"/>
-              <a:t>5/11/2022</a:t>
+              <a:t>6/14/2022</a:t>
             </a:fld>
             <a:endParaRPr lang="en-US"/>
           </a:p>
@@ -1242,7 +1243,7 @@
           <a:p>
             <a:fld id="{EBD465F7-E794-4602-B363-1981CA8F30E1}" type="datetimeFigureOut">
               <a:rPr lang="en-US" smtClean="0"/>
-              <a:t>5/11/2022</a:t>
+              <a:t>6/14/2022</a:t>
             </a:fld>
             <a:endParaRPr lang="en-US"/>
           </a:p>
@@ -1609,7 +1610,7 @@
           <a:p>
             <a:fld id="{EBD465F7-E794-4602-B363-1981CA8F30E1}" type="datetimeFigureOut">
               <a:rPr lang="en-US" smtClean="0"/>
-              <a:t>5/11/2022</a:t>
+              <a:t>6/14/2022</a:t>
             </a:fld>
             <a:endParaRPr lang="en-US"/>
           </a:p>
@@ -1727,7 +1728,7 @@
           <a:p>
             <a:fld id="{EBD465F7-E794-4602-B363-1981CA8F30E1}" type="datetimeFigureOut">
               <a:rPr lang="en-US" smtClean="0"/>
-              <a:t>5/11/2022</a:t>
+              <a:t>6/14/2022</a:t>
             </a:fld>
             <a:endParaRPr lang="en-US"/>
           </a:p>
@@ -1822,7 +1823,7 @@
           <a:p>
             <a:fld id="{EBD465F7-E794-4602-B363-1981CA8F30E1}" type="datetimeFigureOut">
               <a:rPr lang="en-US" smtClean="0"/>
-              <a:t>5/11/2022</a:t>
+              <a:t>6/14/2022</a:t>
             </a:fld>
             <a:endParaRPr lang="en-US"/>
           </a:p>
@@ -2099,7 +2100,7 @@
           <a:p>
             <a:fld id="{EBD465F7-E794-4602-B363-1981CA8F30E1}" type="datetimeFigureOut">
               <a:rPr lang="en-US" smtClean="0"/>
-              <a:t>5/11/2022</a:t>
+              <a:t>6/14/2022</a:t>
             </a:fld>
             <a:endParaRPr lang="en-US"/>
           </a:p>
@@ -2352,7 +2353,7 @@
           <a:p>
             <a:fld id="{EBD465F7-E794-4602-B363-1981CA8F30E1}" type="datetimeFigureOut">
               <a:rPr lang="en-US" smtClean="0"/>
-              <a:t>5/11/2022</a:t>
+              <a:t>6/14/2022</a:t>
             </a:fld>
             <a:endParaRPr lang="en-US"/>
           </a:p>
@@ -2565,7 +2566,7 @@
           <a:p>
             <a:fld id="{EBD465F7-E794-4602-B363-1981CA8F30E1}" type="datetimeFigureOut">
               <a:rPr lang="en-US" smtClean="0"/>
-              <a:t>5/11/2022</a:t>
+              <a:t>6/14/2022</a:t>
             </a:fld>
             <a:endParaRPr lang="en-US"/>
           </a:p>
@@ -2970,68 +2971,76 @@
           <a:chExt cx="0" cy="0"/>
         </a:xfrm>
       </p:grpSpPr>
-      <p:pic>
-        <p:nvPicPr>
-          <p:cNvPr id="21" name="Picture 20"/>
-          <p:cNvPicPr>
-            <a:picLocks noChangeAspect="1"/>
-          </p:cNvPicPr>
+      <p:sp>
+        <p:nvSpPr>
+          <p:cNvPr id="86" name="TextBox 85"/>
+          <p:cNvSpPr txBox="1"/>
           <p:nvPr/>
-        </p:nvPicPr>
-        <p:blipFill>
-          <a:blip r:embed="rId2"/>
-          <a:stretch>
-            <a:fillRect/>
-          </a:stretch>
-        </p:blipFill>
+        </p:nvSpPr>
         <p:spPr>
           <a:xfrm>
-            <a:off x="838800" y="3945600"/>
-            <a:ext cx="3703641" cy="3703641"/>
+            <a:off x="9232900" y="2489200"/>
+            <a:ext cx="2641600" cy="1446550"/>
           </a:xfrm>
           <a:prstGeom prst="rect">
             <a:avLst/>
           </a:prstGeom>
+          <a:noFill/>
         </p:spPr>
-      </p:pic>
+        <p:txBody>
+          <a:bodyPr wrap="square" rtlCol="0">
+            <a:spAutoFit/>
+          </a:bodyPr>
+          <a:lstStyle/>
+          <a:p>
+            <a:r>
+              <a:rPr lang="en-US" sz="4400" dirty="0" smtClean="0">
+                <a:solidFill>
+                  <a:srgbClr val="FF0000"/>
+                </a:solidFill>
+              </a:rPr>
+              <a:t>NOT YET CROPPED!</a:t>
+            </a:r>
+            <a:endParaRPr lang="en-US" sz="4400" dirty="0">
+              <a:solidFill>
+                <a:srgbClr val="FF0000"/>
+              </a:solidFill>
+            </a:endParaRPr>
+          </a:p>
+        </p:txBody>
+      </p:sp>
       <p:grpSp>
         <p:nvGrpSpPr>
-          <p:cNvPr id="85" name="Group 84"/>
+          <p:cNvPr id="2" name="Group 1"/>
           <p:cNvGrpSpPr/>
           <p:nvPr/>
         </p:nvGrpSpPr>
         <p:grpSpPr>
           <a:xfrm>
-            <a:off x="628162" y="-432000"/>
-            <a:ext cx="7783088" cy="4707118"/>
-            <a:chOff x="628162" y="-432000"/>
-            <a:chExt cx="7783088" cy="4707118"/>
+            <a:off x="514350" y="-432000"/>
+            <a:ext cx="7896900" cy="8218413"/>
+            <a:chOff x="514350" y="-432000"/>
+            <a:chExt cx="7896900" cy="8218413"/>
           </a:xfrm>
         </p:grpSpPr>
         <p:pic>
           <p:nvPicPr>
-            <p:cNvPr id="6" name="Picture 5"/>
+            <p:cNvPr id="21" name="Picture 20"/>
             <p:cNvPicPr>
               <a:picLocks noChangeAspect="1"/>
             </p:cNvPicPr>
             <p:nvPr/>
           </p:nvPicPr>
           <p:blipFill>
-            <a:blip r:embed="rId3">
-              <a:extLst>
-                <a:ext uri="{28A0092B-C50C-407E-A947-70E740481C1C}">
-                  <a14:useLocalDpi xmlns:a14="http://schemas.microsoft.com/office/drawing/2010/main" val="0"/>
-                </a:ext>
-              </a:extLst>
-            </a:blip>
+            <a:blip r:embed="rId2"/>
             <a:stretch>
               <a:fillRect/>
             </a:stretch>
           </p:blipFill>
           <p:spPr>
             <a:xfrm>
-              <a:off x="3744000" y="-432000"/>
-              <a:ext cx="4667250" cy="4667250"/>
+              <a:off x="838800" y="3945600"/>
+              <a:ext cx="3703641" cy="3703641"/>
             </a:xfrm>
             <a:prstGeom prst="rect">
               <a:avLst/>
@@ -3040,117 +3049,28 @@
         </p:pic>
         <p:grpSp>
           <p:nvGrpSpPr>
-            <p:cNvPr id="10" name="Group 9"/>
+            <p:cNvPr id="85" name="Group 84"/>
             <p:cNvGrpSpPr/>
             <p:nvPr/>
           </p:nvGrpSpPr>
           <p:grpSpPr>
             <a:xfrm>
-              <a:off x="628162" y="519458"/>
-              <a:ext cx="3813667" cy="3755660"/>
-              <a:chOff x="628162" y="519458"/>
-              <a:chExt cx="3813667" cy="3755660"/>
+              <a:off x="514350" y="-432000"/>
+              <a:ext cx="7896900" cy="4707118"/>
+              <a:chOff x="514350" y="-432000"/>
+              <a:chExt cx="7896900" cy="4707118"/>
             </a:xfrm>
           </p:grpSpPr>
-          <p:sp>
-            <p:nvSpPr>
-              <p:cNvPr id="4" name="TextBox 3"/>
-              <p:cNvSpPr txBox="1"/>
-              <p:nvPr/>
-            </p:nvSpPr>
-            <p:spPr>
-              <a:xfrm>
-                <a:off x="628162" y="519458"/>
-                <a:ext cx="552893" cy="523220"/>
-              </a:xfrm>
-              <a:prstGeom prst="rect">
-                <a:avLst/>
-              </a:prstGeom>
-              <a:noFill/>
-            </p:spPr>
-            <p:txBody>
-              <a:bodyPr wrap="square" rtlCol="0">
-                <a:spAutoFit/>
-              </a:bodyPr>
-              <a:lstStyle/>
-              <a:p>
-                <a:r>
-                  <a:rPr lang="en-US" sz="2800" dirty="0" smtClean="0"/>
-                  <a:t>A</a:t>
-                </a:r>
-                <a:endParaRPr lang="en-US" sz="2800" dirty="0"/>
-              </a:p>
-            </p:txBody>
-          </p:sp>
-          <p:sp>
-            <p:nvSpPr>
-              <p:cNvPr id="5" name="TextBox 4"/>
-              <p:cNvSpPr txBox="1"/>
-              <p:nvPr/>
-            </p:nvSpPr>
-            <p:spPr>
-              <a:xfrm>
-                <a:off x="3888936" y="519458"/>
-                <a:ext cx="552893" cy="523220"/>
-              </a:xfrm>
-              <a:prstGeom prst="rect">
-                <a:avLst/>
-              </a:prstGeom>
-              <a:noFill/>
-            </p:spPr>
-            <p:txBody>
-              <a:bodyPr wrap="square" rtlCol="0">
-                <a:spAutoFit/>
-              </a:bodyPr>
-              <a:lstStyle/>
-              <a:p>
-                <a:r>
-                  <a:rPr lang="en-US" sz="2800" dirty="0"/>
-                  <a:t>B</a:t>
-                </a:r>
-              </a:p>
-            </p:txBody>
-          </p:sp>
-          <p:sp>
-            <p:nvSpPr>
-              <p:cNvPr id="7" name="TextBox 6"/>
-              <p:cNvSpPr txBox="1"/>
-              <p:nvPr/>
-            </p:nvSpPr>
-            <p:spPr>
-              <a:xfrm>
-                <a:off x="628162" y="3751898"/>
-                <a:ext cx="448039" cy="523220"/>
-              </a:xfrm>
-              <a:prstGeom prst="rect">
-                <a:avLst/>
-              </a:prstGeom>
-              <a:noFill/>
-            </p:spPr>
-            <p:txBody>
-              <a:bodyPr wrap="square" rtlCol="0">
-                <a:spAutoFit/>
-              </a:bodyPr>
-              <a:lstStyle/>
-              <a:p>
-                <a:r>
-                  <a:rPr lang="en-US" sz="2800" dirty="0" smtClean="0"/>
-                  <a:t>C</a:t>
-                </a:r>
-                <a:endParaRPr lang="en-US" sz="2800" dirty="0"/>
-              </a:p>
-            </p:txBody>
-          </p:sp>
           <p:pic>
             <p:nvPicPr>
-              <p:cNvPr id="8" name="Picture 7"/>
+              <p:cNvPr id="6" name="Picture 5"/>
               <p:cNvPicPr>
                 <a:picLocks noChangeAspect="1"/>
               </p:cNvPicPr>
               <p:nvPr/>
             </p:nvPicPr>
             <p:blipFill>
-              <a:blip r:embed="rId4" cstate="print">
+              <a:blip r:embed="rId3">
                 <a:extLst>
                   <a:ext uri="{28A0092B-C50C-407E-A947-70E740481C1C}">
                     <a14:useLocalDpi xmlns:a14="http://schemas.microsoft.com/office/drawing/2010/main" val="0"/>
@@ -3163,150 +3083,247 @@
             </p:blipFill>
             <p:spPr>
               <a:xfrm>
-                <a:off x="904608" y="1140673"/>
-                <a:ext cx="2771292" cy="1788599"/>
+                <a:off x="3744000" y="-432000"/>
+                <a:ext cx="4667250" cy="4667250"/>
               </a:xfrm>
               <a:prstGeom prst="rect">
                 <a:avLst/>
               </a:prstGeom>
             </p:spPr>
           </p:pic>
+          <p:grpSp>
+            <p:nvGrpSpPr>
+              <p:cNvPr id="10" name="Group 9"/>
+              <p:cNvGrpSpPr/>
+              <p:nvPr/>
+            </p:nvGrpSpPr>
+            <p:grpSpPr>
+              <a:xfrm>
+                <a:off x="514350" y="519458"/>
+                <a:ext cx="3927479" cy="3755660"/>
+                <a:chOff x="514350" y="519458"/>
+                <a:chExt cx="3927479" cy="3755660"/>
+              </a:xfrm>
+            </p:grpSpPr>
+            <p:sp>
+              <p:nvSpPr>
+                <p:cNvPr id="4" name="TextBox 3"/>
+                <p:cNvSpPr txBox="1"/>
+                <p:nvPr/>
+              </p:nvSpPr>
+              <p:spPr>
+                <a:xfrm>
+                  <a:off x="514350" y="519458"/>
+                  <a:ext cx="666705" cy="523220"/>
+                </a:xfrm>
+                <a:prstGeom prst="rect">
+                  <a:avLst/>
+                </a:prstGeom>
+                <a:noFill/>
+              </p:spPr>
+              <p:txBody>
+                <a:bodyPr wrap="square" rtlCol="0">
+                  <a:spAutoFit/>
+                </a:bodyPr>
+                <a:lstStyle/>
+                <a:p>
+                  <a:r>
+                    <a:rPr lang="en-US" sz="2800" i="1" dirty="0" smtClean="0"/>
+                    <a:t>(a)</a:t>
+                  </a:r>
+                  <a:endParaRPr lang="en-US" sz="2800" i="1" dirty="0"/>
+                </a:p>
+              </p:txBody>
+            </p:sp>
+            <p:sp>
+              <p:nvSpPr>
+                <p:cNvPr id="5" name="TextBox 4"/>
+                <p:cNvSpPr txBox="1"/>
+                <p:nvPr/>
+              </p:nvSpPr>
+              <p:spPr>
+                <a:xfrm>
+                  <a:off x="3848854" y="519458"/>
+                  <a:ext cx="592975" cy="523220"/>
+                </a:xfrm>
+                <a:prstGeom prst="rect">
+                  <a:avLst/>
+                </a:prstGeom>
+                <a:noFill/>
+              </p:spPr>
+              <p:txBody>
+                <a:bodyPr wrap="square" rtlCol="0">
+                  <a:spAutoFit/>
+                </a:bodyPr>
+                <a:lstStyle/>
+                <a:p>
+                  <a:r>
+                    <a:rPr lang="en-US" sz="2800" i="1" dirty="0" smtClean="0"/>
+                    <a:t>(b)</a:t>
+                  </a:r>
+                  <a:endParaRPr lang="en-US" sz="2800" i="1" dirty="0"/>
+                </a:p>
+              </p:txBody>
+            </p:sp>
+            <p:sp>
+              <p:nvSpPr>
+                <p:cNvPr id="7" name="TextBox 6"/>
+                <p:cNvSpPr txBox="1"/>
+                <p:nvPr/>
+              </p:nvSpPr>
+              <p:spPr>
+                <a:xfrm>
+                  <a:off x="514350" y="3751898"/>
+                  <a:ext cx="561851" cy="523220"/>
+                </a:xfrm>
+                <a:prstGeom prst="rect">
+                  <a:avLst/>
+                </a:prstGeom>
+                <a:noFill/>
+              </p:spPr>
+              <p:txBody>
+                <a:bodyPr wrap="square" rtlCol="0">
+                  <a:spAutoFit/>
+                </a:bodyPr>
+                <a:lstStyle/>
+                <a:p>
+                  <a:r>
+                    <a:rPr lang="en-US" sz="2800" i="1" dirty="0" smtClean="0"/>
+                    <a:t>(c)</a:t>
+                  </a:r>
+                  <a:endParaRPr lang="en-US" sz="2800" i="1" dirty="0"/>
+                </a:p>
+              </p:txBody>
+            </p:sp>
+            <p:pic>
+              <p:nvPicPr>
+                <p:cNvPr id="8" name="Picture 7"/>
+                <p:cNvPicPr>
+                  <a:picLocks noChangeAspect="1"/>
+                </p:cNvPicPr>
+                <p:nvPr/>
+              </p:nvPicPr>
+              <p:blipFill>
+                <a:blip r:embed="rId4" cstate="print">
+                  <a:extLst>
+                    <a:ext uri="{28A0092B-C50C-407E-A947-70E740481C1C}">
+                      <a14:useLocalDpi xmlns:a14="http://schemas.microsoft.com/office/drawing/2010/main" val="0"/>
+                    </a:ext>
+                  </a:extLst>
+                </a:blip>
+                <a:stretch>
+                  <a:fillRect/>
+                </a:stretch>
+              </p:blipFill>
+              <p:spPr>
+                <a:xfrm>
+                  <a:off x="904608" y="1140673"/>
+                  <a:ext cx="2771292" cy="1788599"/>
+                </a:xfrm>
+                <a:prstGeom prst="rect">
+                  <a:avLst/>
+                </a:prstGeom>
+              </p:spPr>
+            </p:pic>
+          </p:grpSp>
         </p:grpSp>
-      </p:grpSp>
-      <p:sp>
-        <p:nvSpPr>
-          <p:cNvPr id="86" name="TextBox 85"/>
-          <p:cNvSpPr txBox="1"/>
-          <p:nvPr/>
-        </p:nvSpPr>
-        <p:spPr>
-          <a:xfrm>
-            <a:off x="9232900" y="2489200"/>
-            <a:ext cx="2641600" cy="1446550"/>
-          </a:xfrm>
-          <a:prstGeom prst="rect">
-            <a:avLst/>
-          </a:prstGeom>
-          <a:noFill/>
-        </p:spPr>
-        <p:txBody>
-          <a:bodyPr wrap="square" rtlCol="0">
-            <a:spAutoFit/>
-          </a:bodyPr>
-          <a:lstStyle/>
-          <a:p>
-            <a:r>
-              <a:rPr lang="en-US" sz="4400" dirty="0" smtClean="0">
-                <a:solidFill>
-                  <a:srgbClr val="FF0000"/>
-                </a:solidFill>
-              </a:rPr>
-              <a:t>NOT YET CROPPED!</a:t>
-            </a:r>
-            <a:endParaRPr lang="en-US" sz="4400" dirty="0">
-              <a:solidFill>
-                <a:srgbClr val="FF0000"/>
-              </a:solidFill>
-            </a:endParaRPr>
-          </a:p>
-        </p:txBody>
-      </p:sp>
-      <p:sp>
-        <p:nvSpPr>
-          <p:cNvPr id="20" name="TextBox 19"/>
-          <p:cNvSpPr txBox="1"/>
-          <p:nvPr/>
-        </p:nvSpPr>
-        <p:spPr>
-          <a:xfrm>
-            <a:off x="1338320" y="3900408"/>
-            <a:ext cx="3472543" cy="307777"/>
-          </a:xfrm>
-          <a:prstGeom prst="rect">
-            <a:avLst/>
-          </a:prstGeom>
-          <a:noFill/>
-        </p:spPr>
-        <p:txBody>
-          <a:bodyPr wrap="square" rtlCol="0">
-            <a:spAutoFit/>
-          </a:bodyPr>
-          <a:lstStyle/>
-          <a:p>
-            <a:r>
-              <a:rPr lang="en-US" sz="1400" dirty="0" smtClean="0">
+        <p:sp>
+          <p:nvSpPr>
+            <p:cNvPr id="20" name="TextBox 19"/>
+            <p:cNvSpPr txBox="1"/>
+            <p:nvPr/>
+          </p:nvSpPr>
+          <p:spPr>
+            <a:xfrm>
+              <a:off x="1338320" y="3900408"/>
+              <a:ext cx="3472543" cy="307777"/>
+            </a:xfrm>
+            <a:prstGeom prst="rect">
+              <a:avLst/>
+            </a:prstGeom>
+            <a:noFill/>
+          </p:spPr>
+          <p:txBody>
+            <a:bodyPr wrap="square" rtlCol="0">
+              <a:spAutoFit/>
+            </a:bodyPr>
+            <a:lstStyle/>
+            <a:p>
+              <a:r>
+                <a:rPr lang="en-US" sz="1400" dirty="0" smtClean="0">
+                  <a:latin typeface="Arial" panose="020B0604020202020204" pitchFamily="34" charset="0"/>
+                  <a:cs typeface="Arial" panose="020B0604020202020204" pitchFamily="34" charset="0"/>
+                </a:rPr>
+                <a:t>Computation of individual errors</a:t>
+              </a:r>
+              <a:endParaRPr lang="en-US" sz="1400" dirty="0">
                 <a:latin typeface="Arial" panose="020B0604020202020204" pitchFamily="34" charset="0"/>
                 <a:cs typeface="Arial" panose="020B0604020202020204" pitchFamily="34" charset="0"/>
-              </a:rPr>
-              <a:t>Computation of individual errors</a:t>
-            </a:r>
-            <a:endParaRPr lang="en-US" sz="1400" dirty="0">
-              <a:latin typeface="Arial" panose="020B0604020202020204" pitchFamily="34" charset="0"/>
-              <a:cs typeface="Arial" panose="020B0604020202020204" pitchFamily="34" charset="0"/>
-            </a:endParaRPr>
-          </a:p>
-        </p:txBody>
-      </p:sp>
-      <p:pic>
-        <p:nvPicPr>
-          <p:cNvPr id="22" name="Picture 21"/>
-          <p:cNvPicPr>
-            <a:picLocks noChangeAspect="1"/>
-          </p:cNvPicPr>
-          <p:nvPr/>
-        </p:nvPicPr>
-        <p:blipFill>
-          <a:blip r:embed="rId5"/>
-          <a:stretch>
-            <a:fillRect/>
-          </a:stretch>
-        </p:blipFill>
-        <p:spPr>
-          <a:xfrm>
-            <a:off x="4428000" y="3945600"/>
-            <a:ext cx="3840813" cy="3840813"/>
-          </a:xfrm>
-          <a:prstGeom prst="rect">
-            <a:avLst/>
-          </a:prstGeom>
-        </p:spPr>
-      </p:pic>
-      <p:sp>
-        <p:nvSpPr>
-          <p:cNvPr id="23" name="TextBox 22"/>
-          <p:cNvSpPr txBox="1"/>
-          <p:nvPr/>
-        </p:nvSpPr>
-        <p:spPr>
-          <a:xfrm>
-            <a:off x="4568522" y="3813453"/>
-            <a:ext cx="3472543" cy="523220"/>
-          </a:xfrm>
-          <a:prstGeom prst="rect">
-            <a:avLst/>
-          </a:prstGeom>
-          <a:noFill/>
-        </p:spPr>
-        <p:txBody>
-          <a:bodyPr wrap="square" rtlCol="0">
-            <a:spAutoFit/>
-          </a:bodyPr>
-          <a:lstStyle/>
-          <a:p>
-            <a:r>
-              <a:rPr lang="en-US" sz="1400" dirty="0" smtClean="0">
+              </a:endParaRPr>
+            </a:p>
+          </p:txBody>
+        </p:sp>
+        <p:pic>
+          <p:nvPicPr>
+            <p:cNvPr id="22" name="Picture 21"/>
+            <p:cNvPicPr>
+              <a:picLocks noChangeAspect="1"/>
+            </p:cNvPicPr>
+            <p:nvPr/>
+          </p:nvPicPr>
+          <p:blipFill>
+            <a:blip r:embed="rId5"/>
+            <a:stretch>
+              <a:fillRect/>
+            </a:stretch>
+          </p:blipFill>
+          <p:spPr>
+            <a:xfrm>
+              <a:off x="4428000" y="3945600"/>
+              <a:ext cx="3840813" cy="3840813"/>
+            </a:xfrm>
+            <a:prstGeom prst="rect">
+              <a:avLst/>
+            </a:prstGeom>
+          </p:spPr>
+        </p:pic>
+        <p:sp>
+          <p:nvSpPr>
+            <p:cNvPr id="23" name="TextBox 22"/>
+            <p:cNvSpPr txBox="1"/>
+            <p:nvPr/>
+          </p:nvSpPr>
+          <p:spPr>
+            <a:xfrm>
+              <a:off x="4568522" y="3813453"/>
+              <a:ext cx="3472543" cy="523220"/>
+            </a:xfrm>
+            <a:prstGeom prst="rect">
+              <a:avLst/>
+            </a:prstGeom>
+            <a:noFill/>
+          </p:spPr>
+          <p:txBody>
+            <a:bodyPr wrap="square" rtlCol="0">
+              <a:spAutoFit/>
+            </a:bodyPr>
+            <a:lstStyle/>
+            <a:p>
+              <a:r>
+                <a:rPr lang="en-US" sz="1400" dirty="0" smtClean="0">
+                  <a:latin typeface="Arial" panose="020B0604020202020204" pitchFamily="34" charset="0"/>
+                  <a:cs typeface="Arial" panose="020B0604020202020204" pitchFamily="34" charset="0"/>
+                </a:rPr>
+                <a:t>Computation of aggregate trajectory (Wisdom of the Crowd) and its errors</a:t>
+              </a:r>
+              <a:endParaRPr lang="en-US" sz="1400" dirty="0">
                 <a:latin typeface="Arial" panose="020B0604020202020204" pitchFamily="34" charset="0"/>
                 <a:cs typeface="Arial" panose="020B0604020202020204" pitchFamily="34" charset="0"/>
-              </a:rPr>
-              <a:t>Computation of aggregate trajectory (Wisdom of the Crowd) and its errors</a:t>
-            </a:r>
-            <a:endParaRPr lang="en-US" sz="1400" dirty="0">
-              <a:latin typeface="Arial" panose="020B0604020202020204" pitchFamily="34" charset="0"/>
-              <a:cs typeface="Arial" panose="020B0604020202020204" pitchFamily="34" charset="0"/>
-            </a:endParaRPr>
-          </a:p>
-        </p:txBody>
-      </p:sp>
+              </a:endParaRPr>
+            </a:p>
+          </p:txBody>
+        </p:sp>
+      </p:grpSp>
     </p:spTree>
     <p:extLst>
       <p:ext uri="{BB962C8B-B14F-4D97-AF65-F5344CB8AC3E}">
@@ -3365,15 +3382,7 @@
                   <a:srgbClr val="FF0000"/>
                 </a:solidFill>
               </a:rPr>
-              <a:t>CROPPED</a:t>
-            </a:r>
-            <a:r>
-              <a:rPr lang="en-US" sz="4400" dirty="0" smtClean="0">
-                <a:solidFill>
-                  <a:srgbClr val="FF0000"/>
-                </a:solidFill>
-              </a:rPr>
-              <a:t>!</a:t>
+              <a:t>CROPPED!</a:t>
             </a:r>
             <a:endParaRPr lang="en-US" sz="4400" dirty="0">
               <a:solidFill>
@@ -3385,7 +3394,7 @@
       </p:sp>
       <p:pic>
         <p:nvPicPr>
-          <p:cNvPr id="3" name="Picture 2"/>
+          <p:cNvPr id="2" name="Picture 1"/>
           <p:cNvPicPr>
             <a:picLocks noChangeAspect="1"/>
           </p:cNvPicPr>
@@ -3393,20 +3402,17 @@
         </p:nvPicPr>
         <p:blipFill rotWithShape="1">
           <a:blip r:embed="rId2"/>
-          <a:srcRect l="-472" t="9666" r="2900" b="858"/>
+          <a:srcRect l="717" t="9542" r="2933" b="1100"/>
           <a:stretch/>
         </p:blipFill>
         <p:spPr>
           <a:xfrm>
-            <a:off x="1344386" y="-268060"/>
-            <a:ext cx="7715251" cy="7353300"/>
+            <a:off x="1574798" y="-194742"/>
+            <a:ext cx="7730067" cy="7349067"/>
           </a:xfrm>
           <a:prstGeom prst="rect">
             <a:avLst/>
           </a:prstGeom>
-          <a:solidFill>
-            <a:schemeClr val="bg1"/>
-          </a:solidFill>
         </p:spPr>
       </p:pic>
     </p:spTree>
@@ -3419,6 +3425,122 @@
   <p:clrMapOvr>
     <a:masterClrMapping/>
   </p:clrMapOvr>
+  <p:timing>
+    <p:tnLst>
+      <p:par>
+        <p:cTn id="1" dur="indefinite" restart="never" nodeType="tmRoot"/>
+      </p:par>
+    </p:tnLst>
+  </p:timing>
+</p:sld>
+</file>
+
+<file path=ppt/slides/slide3.xml><?xml version="1.0" encoding="utf-8"?>
+<p:sld xmlns:a="http://schemas.openxmlformats.org/drawingml/2006/main" xmlns:r="http://schemas.openxmlformats.org/officeDocument/2006/relationships" xmlns:p="http://schemas.openxmlformats.org/presentationml/2006/main">
+  <p:cSld>
+    <p:spTree>
+      <p:nvGrpSpPr>
+        <p:cNvPr id="1" name=""/>
+        <p:cNvGrpSpPr/>
+        <p:nvPr/>
+      </p:nvGrpSpPr>
+      <p:grpSpPr>
+        <a:xfrm>
+          <a:off x="0" y="0"/>
+          <a:ext cx="0" cy="0"/>
+          <a:chOff x="0" y="0"/>
+          <a:chExt cx="0" cy="0"/>
+        </a:xfrm>
+      </p:grpSpPr>
+      <p:pic>
+        <p:nvPicPr>
+          <p:cNvPr id="3" name="Picture 2"/>
+          <p:cNvPicPr>
+            <a:picLocks noChangeAspect="1"/>
+          </p:cNvPicPr>
+          <p:nvPr/>
+        </p:nvPicPr>
+        <p:blipFill>
+          <a:blip r:embed="rId2"/>
+          <a:stretch>
+            <a:fillRect/>
+          </a:stretch>
+        </p:blipFill>
+        <p:spPr>
+          <a:xfrm>
+            <a:off x="1365250" y="-225954"/>
+            <a:ext cx="7734300" cy="7343775"/>
+          </a:xfrm>
+          <a:prstGeom prst="rect">
+            <a:avLst/>
+          </a:prstGeom>
+        </p:spPr>
+      </p:pic>
+      <p:sp>
+        <p:nvSpPr>
+          <p:cNvPr id="4" name="TextBox 3"/>
+          <p:cNvSpPr txBox="1"/>
+          <p:nvPr/>
+        </p:nvSpPr>
+        <p:spPr>
+          <a:xfrm>
+            <a:off x="9232900" y="2489200"/>
+            <a:ext cx="2641600" cy="2800767"/>
+          </a:xfrm>
+          <a:prstGeom prst="rect">
+            <a:avLst/>
+          </a:prstGeom>
+          <a:noFill/>
+        </p:spPr>
+        <p:txBody>
+          <a:bodyPr wrap="square" rtlCol="0">
+            <a:spAutoFit/>
+          </a:bodyPr>
+          <a:lstStyle/>
+          <a:p>
+            <a:r>
+              <a:rPr lang="en-US" sz="4400" dirty="0" smtClean="0">
+                <a:solidFill>
+                  <a:srgbClr val="FF0000"/>
+                </a:solidFill>
+              </a:rPr>
+              <a:t>CROPPED</a:t>
+            </a:r>
+          </a:p>
+          <a:p>
+            <a:r>
+              <a:rPr lang="en-US" sz="4400" dirty="0" smtClean="0">
+                <a:solidFill>
+                  <a:srgbClr val="FF0000"/>
+                </a:solidFill>
+              </a:rPr>
+              <a:t>AND SAVED AS FIGURE</a:t>
+            </a:r>
+            <a:endParaRPr lang="en-US" sz="4400" dirty="0">
+              <a:solidFill>
+                <a:srgbClr val="FF0000"/>
+              </a:solidFill>
+            </a:endParaRPr>
+          </a:p>
+        </p:txBody>
+      </p:sp>
+    </p:spTree>
+    <p:extLst>
+      <p:ext uri="{BB962C8B-B14F-4D97-AF65-F5344CB8AC3E}">
+        <p14:creationId xmlns:p14="http://schemas.microsoft.com/office/powerpoint/2010/main" val="730954119"/>
+      </p:ext>
+    </p:extLst>
+  </p:cSld>
+  <p:clrMapOvr>
+    <a:masterClrMapping/>
+  </p:clrMapOvr>
+  <p:timing>
+    <p:tnLst>
+      <p:par>
+        <p:cTn id="1" dur="indefinite" restart="never" nodeType="tmRoot"/>
+      </p:par>
+    </p:tnLst>
+  </p:timing>
 </p:sld>
 </file>
 

</xml_diff>